<commit_message>
lec 2 & 4 slides
</commit_message>
<xml_diff>
--- a/spring13/slides13/cases.pptx
+++ b/spring13/slides13/cases.pptx
@@ -6,10 +6,10 @@
     <p:sldMasterId id="2147483651" r:id="rId2"/>
   </p:sldMasterIdLst>
   <p:notesMasterIdLst>
-    <p:notesMasterId r:id="rId13"/>
+    <p:notesMasterId r:id="rId12"/>
   </p:notesMasterIdLst>
   <p:handoutMasterIdLst>
-    <p:handoutMasterId r:id="rId14"/>
+    <p:handoutMasterId r:id="rId13"/>
   </p:handoutMasterIdLst>
   <p:sldIdLst>
     <p:sldId id="404" r:id="rId3"/>
@@ -21,12 +21,11 @@
     <p:sldId id="453" r:id="rId9"/>
     <p:sldId id="469" r:id="rId10"/>
     <p:sldId id="470" r:id="rId11"/>
-    <p:sldId id="471" r:id="rId12"/>
   </p:sldIdLst>
   <p:sldSz cx="9144000" cy="6858000" type="screen4x3"/>
   <p:notesSz cx="7315200" cy="9601200"/>
   <p:custDataLst>
-    <p:tags r:id="rId16"/>
+    <p:tags r:id="rId15"/>
   </p:custDataLst>
   <p:defaultTextStyle>
     <a:defPPr>
@@ -911,93 +910,6 @@
             <a:endParaRPr lang="en-US" smtClean="0">
               <a:cs typeface="Arial" charset="0"/>
             </a:endParaRPr>
-          </a:p>
-        </p:txBody>
-      </p:sp>
-    </p:spTree>
-  </p:cSld>
-  <p:clrMapOvr>
-    <a:masterClrMapping/>
-  </p:clrMapOvr>
-</p:notes>
-</file>
-
-<file path=ppt/notesSlides/notesSlide10.xml><?xml version="1.0" encoding="utf-8"?>
-<p:notes xmlns:a="http://schemas.openxmlformats.org/drawingml/2006/main" xmlns:r="http://schemas.openxmlformats.org/officeDocument/2006/relationships" xmlns:p="http://schemas.openxmlformats.org/presentationml/2006/main">
-  <p:cSld>
-    <p:spTree>
-      <p:nvGrpSpPr>
-        <p:cNvPr id="1" name=""/>
-        <p:cNvGrpSpPr/>
-        <p:nvPr/>
-      </p:nvGrpSpPr>
-      <p:grpSpPr>
-        <a:xfrm>
-          <a:off x="0" y="0"/>
-          <a:ext cx="0" cy="0"/>
-          <a:chOff x="0" y="0"/>
-          <a:chExt cx="0" cy="0"/>
-        </a:xfrm>
-      </p:grpSpPr>
-      <p:sp>
-        <p:nvSpPr>
-          <p:cNvPr id="72706" name="Rectangle 7"/>
-          <p:cNvSpPr>
-            <a:spLocks noGrp="1" noChangeArrowheads="1"/>
-          </p:cNvSpPr>
-          <p:nvPr>
-            <p:ph type="sldNum" sz="quarter" idx="5"/>
-          </p:nvPr>
-        </p:nvSpPr>
-        <p:spPr>
-          <a:noFill/>
-        </p:spPr>
-        <p:txBody>
-          <a:bodyPr/>
-          <a:lstStyle/>
-          <a:p>
-            <a:fld id="{6653F924-F418-411E-8C35-24F3766CE997}" type="slidenum">
-              <a:rPr lang="en-US" smtClean="0"/>
-              <a:pPr/>
-              <a:t>10</a:t>
-            </a:fld>
-            <a:endParaRPr lang="en-US" smtClean="0"/>
-          </a:p>
-        </p:txBody>
-      </p:sp>
-      <p:sp>
-        <p:nvSpPr>
-          <p:cNvPr id="72707" name="Rectangle 2"/>
-          <p:cNvSpPr>
-            <a:spLocks noGrp="1" noRot="1" noChangeAspect="1" noChangeArrowheads="1" noTextEdit="1"/>
-          </p:cNvSpPr>
-          <p:nvPr>
-            <p:ph type="sldImg"/>
-          </p:nvPr>
-        </p:nvSpPr>
-        <p:spPr>
-          <a:ln/>
-        </p:spPr>
-      </p:sp>
-      <p:sp>
-        <p:nvSpPr>
-          <p:cNvPr id="72708" name="Rectangle 3"/>
-          <p:cNvSpPr>
-            <a:spLocks noGrp="1" noChangeArrowheads="1"/>
-          </p:cNvSpPr>
-          <p:nvPr>
-            <p:ph type="body" idx="1"/>
-          </p:nvPr>
-        </p:nvSpPr>
-        <p:spPr>
-          <a:noFill/>
-          <a:ln/>
-        </p:spPr>
-        <p:txBody>
-          <a:bodyPr/>
-          <a:lstStyle/>
-          <a:p>
-            <a:endParaRPr lang="en-US" smtClean="0"/>
           </a:p>
         </p:txBody>
       </p:sp>
@@ -8271,163 +8183,6 @@
 </p:sld>
 </file>
 
-<file path=ppt/slides/slide10.xml><?xml version="1.0" encoding="utf-8"?>
-<p:sld xmlns:a="http://schemas.openxmlformats.org/drawingml/2006/main" xmlns:r="http://schemas.openxmlformats.org/officeDocument/2006/relationships" xmlns:p="http://schemas.openxmlformats.org/presentationml/2006/main" show="0">
-  <p:cSld>
-    <p:spTree>
-      <p:nvGrpSpPr>
-        <p:cNvPr id="1" name=""/>
-        <p:cNvGrpSpPr/>
-        <p:nvPr/>
-      </p:nvGrpSpPr>
-      <p:grpSpPr>
-        <a:xfrm>
-          <a:off x="0" y="0"/>
-          <a:ext cx="0" cy="0"/>
-          <a:chOff x="0" y="0"/>
-          <a:chExt cx="0" cy="0"/>
-        </a:xfrm>
-      </p:grpSpPr>
-      <p:sp>
-        <p:nvSpPr>
-          <p:cNvPr id="34819" name="Rectangle 2"/>
-          <p:cNvSpPr>
-            <a:spLocks noGrp="1" noChangeArrowheads="1"/>
-          </p:cNvSpPr>
-          <p:nvPr>
-            <p:ph type="title"/>
-          </p:nvPr>
-        </p:nvSpPr>
-        <p:spPr/>
-        <p:txBody>
-          <a:bodyPr/>
-          <a:lstStyle/>
-          <a:p>
-            <a:r>
-              <a:rPr lang="en-US" sz="4800" dirty="0" smtClean="0"/>
-              <a:t>Team Problems</a:t>
-            </a:r>
-          </a:p>
-        </p:txBody>
-      </p:sp>
-      <p:sp>
-        <p:nvSpPr>
-          <p:cNvPr id="34820" name="Rectangle 3"/>
-          <p:cNvSpPr>
-            <a:spLocks noGrp="1" noChangeArrowheads="1"/>
-          </p:cNvSpPr>
-          <p:nvPr>
-            <p:ph type="body" idx="1"/>
-          </p:nvPr>
-        </p:nvSpPr>
-        <p:spPr>
-          <a:xfrm>
-            <a:off x="502510" y="1479035"/>
-            <a:ext cx="8130746" cy="3900272"/>
-          </a:xfrm>
-        </p:spPr>
-        <p:txBody>
-          <a:bodyPr/>
-          <a:lstStyle/>
-          <a:p>
-            <a:pPr algn="ctr">
-              <a:spcBef>
-                <a:spcPts val="1200"/>
-              </a:spcBef>
-              <a:buFontTx/>
-              <a:buNone/>
-            </a:pPr>
-            <a:r>
-              <a:rPr lang="en-US" sz="11500" dirty="0" smtClean="0"/>
-              <a:t>Problems</a:t>
-            </a:r>
-          </a:p>
-          <a:p>
-            <a:pPr algn="ctr">
-              <a:spcBef>
-                <a:spcPts val="1200"/>
-              </a:spcBef>
-              <a:buFontTx/>
-              <a:buNone/>
-            </a:pPr>
-            <a:r>
-              <a:rPr lang="en-US" sz="11500" dirty="0" smtClean="0"/>
-              <a:t>1―4</a:t>
-            </a:r>
-            <a:endParaRPr lang="en-US" sz="12700" dirty="0" smtClean="0"/>
-          </a:p>
-        </p:txBody>
-      </p:sp>
-      <p:sp>
-        <p:nvSpPr>
-          <p:cNvPr id="5" name="Rectangle 11"/>
-          <p:cNvSpPr>
-            <a:spLocks noGrp="1" noChangeArrowheads="1"/>
-          </p:cNvSpPr>
-          <p:nvPr>
-            <p:ph type="sldNum" sz="quarter" idx="10"/>
-          </p:nvPr>
-        </p:nvSpPr>
-        <p:spPr>
-          <a:xfrm>
-            <a:off x="8392738" y="6594296"/>
-            <a:ext cx="751265" cy="261610"/>
-          </a:xfrm>
-          <a:ln/>
-        </p:spPr>
-        <p:txBody>
-          <a:bodyPr/>
-          <a:lstStyle>
-            <a:lvl1pPr>
-              <a:defRPr/>
-            </a:lvl1pPr>
-          </a:lstStyle>
-          <a:p>
-            <a:pPr>
-              <a:defRPr/>
-            </a:pPr>
-            <a:r>
-              <a:rPr lang="en-US" dirty="0" smtClean="0"/>
-              <a:t>cases.</a:t>
-            </a:r>
-            <a:fld id="{7D4651B8-09C8-4A4D-BE8E-31B6C97A420D}" type="slidenum">
-              <a:rPr lang="en-US" smtClean="0"/>
-              <a:pPr>
-                <a:defRPr/>
-              </a:pPr>
-              <a:t>10</a:t>
-            </a:fld>
-            <a:endParaRPr lang="en-US" dirty="0"/>
-          </a:p>
-        </p:txBody>
-      </p:sp>
-    </p:spTree>
-  </p:cSld>
-  <p:clrMapOvr>
-    <a:masterClrMapping/>
-  </p:clrMapOvr>
-  <mc:AlternateContent xmlns:mc="http://schemas.openxmlformats.org/markup-compatibility/2006">
-    <mc:Choice xmlns:p14="http://schemas.microsoft.com/office/powerpoint/2010/main" Requires="p14">
-      <p:transition p14:dur="100">
-        <p:cut/>
-      </p:transition>
-    </mc:Choice>
-    <mc:Fallback>
-      <p:transition xmlns:p14="http://schemas.microsoft.com/office/powerpoint/2010/main">
-        <p:cut/>
-      </p:transition>
-    </mc:Fallback>
-  </mc:AlternateContent>
-  <p:timing>
-    <p:tnLst>
-      <p:par>
-        <p:cTn xmlns:p14="http://schemas.microsoft.com/office/powerpoint/2010/main" id="1" dur="indefinite" restart="never" nodeType="tmRoot"/>
-      </p:par>
-    </p:tnLst>
-  </p:timing>
-</p:sld>
-</file>
-
 <file path=ppt/slides/slide2.xml><?xml version="1.0" encoding="utf-8"?>
 <p:sld xmlns:a="http://schemas.openxmlformats.org/drawingml/2006/main" xmlns:r="http://schemas.openxmlformats.org/officeDocument/2006/relationships" xmlns:p="http://schemas.openxmlformats.org/presentationml/2006/main">
   <p:cSld>
@@ -8775,7 +8530,7 @@
             <a:graphicData uri="http://schemas.openxmlformats.org/presentationml/2006/ole">
               <mc:AlternateContent xmlns:mc="http://schemas.openxmlformats.org/markup-compatibility/2006">
                 <mc:Choice xmlns:v="urn:schemas-microsoft-com:vml" Requires="v">
-                  <p:oleObj spid="_x0000_s350270" name="Equation" r:id="rId4" imgW="228600" imgH="457200" progId="Equation.DSMT4">
+                  <p:oleObj spid="_x0000_s350273" name="Equation" r:id="rId4" imgW="228600" imgH="457200" progId="Equation.DSMT4">
                     <p:embed/>
                   </p:oleObj>
                 </mc:Choice>
@@ -8896,7 +8651,7 @@
             <a:graphicData uri="http://schemas.openxmlformats.org/presentationml/2006/ole">
               <mc:AlternateContent xmlns:mc="http://schemas.openxmlformats.org/markup-compatibility/2006">
                 <mc:Choice xmlns:v="urn:schemas-microsoft-com:vml" Requires="v">
-                  <p:oleObj spid="_x0000_s350271" name="Equation" r:id="rId6" imgW="279400" imgH="457200" progId="Equation.DSMT4">
+                  <p:oleObj spid="_x0000_s350274" name="Equation" r:id="rId6" imgW="279400" imgH="457200" progId="Equation.DSMT4">
                     <p:embed/>
                   </p:oleObj>
                 </mc:Choice>
@@ -8956,13 +8711,13 @@
   <p:clrMapOvr>
     <a:masterClrMapping/>
   </p:clrMapOvr>
-  <mc:AlternateContent xmlns:mc="http://schemas.openxmlformats.org/markup-compatibility/2006">
-    <mc:Choice xmlns:p14="http://schemas.microsoft.com/office/powerpoint/2010/main" Requires="p14">
+  <mc:AlternateContent xmlns:mc="http://schemas.openxmlformats.org/markup-compatibility/2006" xmlns:p14="http://schemas.microsoft.com/office/powerpoint/2010/main">
+    <mc:Choice Requires="p14">
       <p:transition spd="med" p14:dur="700" advClick="0">
         <p:fade thruBlk="1"/>
       </p:transition>
     </mc:Choice>
-    <mc:Fallback>
+    <mc:Fallback xmlns="">
       <p:transition xmlns:p14="http://schemas.microsoft.com/office/powerpoint/2010/main" spd="med" advClick="0">
         <p:fade thruBlk="1"/>
       </p:transition>
@@ -9673,7 +9428,7 @@
           <a:graphicData uri="http://schemas.openxmlformats.org/presentationml/2006/ole">
             <mc:AlternateContent xmlns:mc="http://schemas.openxmlformats.org/markup-compatibility/2006">
               <mc:Choice xmlns:v="urn:schemas-microsoft-com:vml" Requires="v">
-                <p:oleObj spid="_x0000_s352370" name="Equation" r:id="rId4" imgW="139700" imgH="228600" progId="Equation.DSMT4">
+                <p:oleObj spid="_x0000_s352375" name="Equation" r:id="rId4" imgW="139700" imgH="228600" progId="Equation.DSMT4">
                   <p:embed/>
                 </p:oleObj>
               </mc:Choice>
@@ -9931,7 +9686,7 @@
               <a:graphicData uri="http://schemas.openxmlformats.org/presentationml/2006/ole">
                 <mc:AlternateContent xmlns:mc="http://schemas.openxmlformats.org/markup-compatibility/2006">
                   <mc:Choice xmlns:v="urn:schemas-microsoft-com:vml" Requires="v">
-                    <p:oleObj spid="_x0000_s352371" name="Equation" r:id="rId6" imgW="228600" imgH="457200" progId="Equation.DSMT4">
+                    <p:oleObj spid="_x0000_s352376" name="Equation" r:id="rId6" imgW="228600" imgH="457200" progId="Equation.DSMT4">
                       <p:embed/>
                     </p:oleObj>
                   </mc:Choice>
@@ -10052,7 +9807,7 @@
               <a:graphicData uri="http://schemas.openxmlformats.org/presentationml/2006/ole">
                 <mc:AlternateContent xmlns:mc="http://schemas.openxmlformats.org/markup-compatibility/2006">
                   <mc:Choice xmlns:v="urn:schemas-microsoft-com:vml" Requires="v">
-                    <p:oleObj spid="_x0000_s352372" name="Equation" r:id="rId8" imgW="228600" imgH="457200" progId="Equation.DSMT4">
+                    <p:oleObj spid="_x0000_s352377" name="Equation" r:id="rId8" imgW="228600" imgH="457200" progId="Equation.DSMT4">
                       <p:embed/>
                     </p:oleObj>
                   </mc:Choice>
@@ -10173,7 +9928,7 @@
               <a:graphicData uri="http://schemas.openxmlformats.org/presentationml/2006/ole">
                 <mc:AlternateContent xmlns:mc="http://schemas.openxmlformats.org/markup-compatibility/2006">
                   <mc:Choice xmlns:v="urn:schemas-microsoft-com:vml" Requires="v">
-                    <p:oleObj spid="_x0000_s352373" name="Equation" r:id="rId10" imgW="279400" imgH="457200" progId="Equation.DSMT4">
+                    <p:oleObj spid="_x0000_s352378" name="Equation" r:id="rId10" imgW="279400" imgH="457200" progId="Equation.DSMT4">
                       <p:embed/>
                     </p:oleObj>
                   </mc:Choice>
@@ -11061,7 +10816,7 @@
               <a:graphicData uri="http://schemas.openxmlformats.org/presentationml/2006/ole">
                 <mc:AlternateContent xmlns:mc="http://schemas.openxmlformats.org/markup-compatibility/2006">
                   <mc:Choice xmlns:v="urn:schemas-microsoft-com:vml" Requires="v">
-                    <p:oleObj spid="_x0000_s354391" name="Equation" r:id="rId4" imgW="228600" imgH="457200" progId="Equation.DSMT4">
+                    <p:oleObj spid="_x0000_s354395" name="Equation" r:id="rId4" imgW="228600" imgH="457200" progId="Equation.DSMT4">
                       <p:embed/>
                     </p:oleObj>
                   </mc:Choice>
@@ -11182,7 +10937,7 @@
               <a:graphicData uri="http://schemas.openxmlformats.org/presentationml/2006/ole">
                 <mc:AlternateContent xmlns:mc="http://schemas.openxmlformats.org/markup-compatibility/2006">
                   <mc:Choice xmlns:v="urn:schemas-microsoft-com:vml" Requires="v">
-                    <p:oleObj spid="_x0000_s354392" name="Equation" r:id="rId6" imgW="228600" imgH="457200" progId="Equation.DSMT4">
+                    <p:oleObj spid="_x0000_s354396" name="Equation" r:id="rId6" imgW="228600" imgH="457200" progId="Equation.DSMT4">
                       <p:embed/>
                     </p:oleObj>
                   </mc:Choice>
@@ -11303,7 +11058,7 @@
               <a:graphicData uri="http://schemas.openxmlformats.org/presentationml/2006/ole">
                 <mc:AlternateContent xmlns:mc="http://schemas.openxmlformats.org/markup-compatibility/2006">
                   <mc:Choice xmlns:v="urn:schemas-microsoft-com:vml" Requires="v">
-                    <p:oleObj spid="_x0000_s354393" name="Equation" r:id="rId8" imgW="279400" imgH="457200" progId="Equation.DSMT4">
+                    <p:oleObj spid="_x0000_s354397" name="Equation" r:id="rId8" imgW="279400" imgH="457200" progId="Equation.DSMT4">
                       <p:embed/>
                     </p:oleObj>
                   </mc:Choice>
@@ -11364,13 +11119,13 @@
   <p:clrMapOvr>
     <a:masterClrMapping/>
   </p:clrMapOvr>
-  <mc:AlternateContent xmlns:mc="http://schemas.openxmlformats.org/markup-compatibility/2006">
-    <mc:Choice xmlns:p14="http://schemas.microsoft.com/office/powerpoint/2010/main" Requires="p14">
+  <mc:AlternateContent xmlns:mc="http://schemas.openxmlformats.org/markup-compatibility/2006" xmlns:p14="http://schemas.microsoft.com/office/powerpoint/2010/main">
+    <mc:Choice Requires="p14">
       <p:transition spd="slow" p14:dur="800" advClick="0">
         <p:fade thruBlk="1"/>
       </p:transition>
     </mc:Choice>
-    <mc:Fallback>
+    <mc:Fallback xmlns="">
       <p:transition xmlns:p14="http://schemas.microsoft.com/office/powerpoint/2010/main" spd="slow" advClick="0">
         <p:fade thruBlk="1"/>
       </p:transition>
@@ -11910,7 +11665,7 @@
             <a:graphicData uri="http://schemas.openxmlformats.org/presentationml/2006/ole">
               <mc:AlternateContent xmlns:mc="http://schemas.openxmlformats.org/markup-compatibility/2006">
                 <mc:Choice xmlns:v="urn:schemas-microsoft-com:vml" Requires="v">
-                  <p:oleObj spid="_x0000_s356392" name="Equation" r:id="rId4" imgW="279400" imgH="457200" progId="Equation.DSMT4">
+                  <p:oleObj spid="_x0000_s356394" name="Equation" r:id="rId4" imgW="279400" imgH="457200" progId="Equation.DSMT4">
                     <p:embed/>
                   </p:oleObj>
                 </mc:Choice>
@@ -12642,13 +12397,7 @@
               <a:rPr lang="en-US" sz="4400" dirty="0" smtClean="0">
                 <a:latin typeface="Comic Sans MS" pitchFamily="66" charset="0"/>
               </a:rPr>
-              <a:t>cases breaks </a:t>
-            </a:r>
-            <a:r>
-              <a:rPr lang="en-US" sz="4400" dirty="0" smtClean="0">
-                <a:latin typeface="Comic Sans MS" pitchFamily="66" charset="0"/>
-              </a:rPr>
-              <a:t>a complicated </a:t>
+              <a:t>cases breaks a complicated </a:t>
             </a:r>
             <a:r>
               <a:rPr lang="en-US" sz="4400" dirty="0">
@@ -12798,13 +12547,13 @@
   <p:clrMapOvr>
     <a:masterClrMapping/>
   </p:clrMapOvr>
-  <mc:AlternateContent xmlns:mc="http://schemas.openxmlformats.org/markup-compatibility/2006">
-    <mc:Choice xmlns:p14="http://schemas.microsoft.com/office/powerpoint/2010/main" Requires="p14">
+  <mc:AlternateContent xmlns:mc="http://schemas.openxmlformats.org/markup-compatibility/2006" xmlns:p14="http://schemas.microsoft.com/office/powerpoint/2010/main">
+    <mc:Choice Requires="p14">
       <p:transition spd="slow" p14:dur="900" advClick="0">
         <p:fade thruBlk="1"/>
       </p:transition>
     </mc:Choice>
-    <mc:Fallback>
+    <mc:Fallback xmlns="">
       <p:transition xmlns:p14="http://schemas.microsoft.com/office/powerpoint/2010/main" spd="slow" advClick="0">
         <p:fade thruBlk="1"/>
       </p:transition>
@@ -13070,13 +12819,13 @@
   <p:clrMapOvr>
     <a:masterClrMapping/>
   </p:clrMapOvr>
-  <mc:AlternateContent xmlns:mc="http://schemas.openxmlformats.org/markup-compatibility/2006">
-    <mc:Choice xmlns:p14="http://schemas.microsoft.com/office/powerpoint/2010/main" Requires="p14">
+  <mc:AlternateContent xmlns:mc="http://schemas.openxmlformats.org/markup-compatibility/2006" xmlns:p14="http://schemas.microsoft.com/office/powerpoint/2010/main">
+    <mc:Choice Requires="p14">
       <p:transition spd="slow" p14:dur="800" advClick="0">
         <p:fade thruBlk="1"/>
       </p:transition>
     </mc:Choice>
-    <mc:Fallback>
+    <mc:Fallback xmlns="">
       <p:transition xmlns:p14="http://schemas.microsoft.com/office/powerpoint/2010/main" spd="slow" advClick="0">
         <p:fade thruBlk="1"/>
       </p:transition>

</xml_diff>